<commit_message>
add sessions power points
</commit_message>
<xml_diff>
--- a/session 1/session 1.pptx
+++ b/session 1/session 1.pptx
@@ -5,7 +5,7 @@
     <p:sldMasterId id="2147483648" r:id="rId1"/>
   </p:sldMasterIdLst>
   <p:sldIdLst>
-    <p:sldId id="272" r:id="rId2"/>
+    <p:sldId id="273" r:id="rId2"/>
     <p:sldId id="256" r:id="rId3"/>
     <p:sldId id="260" r:id="rId4"/>
     <p:sldId id="257" r:id="rId5"/>
@@ -271,7 +271,7 @@
           <a:p>
             <a:fld id="{807B2B08-B017-4EEC-B17F-079F487C2A94}" type="datetimeFigureOut">
               <a:rPr lang="en-US" smtClean="0"/>
-              <a:t>10/17/25</a:t>
+              <a:t>11/13/25</a:t>
             </a:fld>
             <a:endParaRPr lang="en-US"/>
           </a:p>
@@ -469,7 +469,7 @@
           <a:p>
             <a:fld id="{807B2B08-B017-4EEC-B17F-079F487C2A94}" type="datetimeFigureOut">
               <a:rPr lang="en-US" smtClean="0"/>
-              <a:t>10/17/25</a:t>
+              <a:t>11/13/25</a:t>
             </a:fld>
             <a:endParaRPr lang="en-US"/>
           </a:p>
@@ -677,7 +677,7 @@
           <a:p>
             <a:fld id="{807B2B08-B017-4EEC-B17F-079F487C2A94}" type="datetimeFigureOut">
               <a:rPr lang="en-US" smtClean="0"/>
-              <a:t>10/17/25</a:t>
+              <a:t>11/13/25</a:t>
             </a:fld>
             <a:endParaRPr lang="en-US"/>
           </a:p>
@@ -875,7 +875,7 @@
           <a:p>
             <a:fld id="{807B2B08-B017-4EEC-B17F-079F487C2A94}" type="datetimeFigureOut">
               <a:rPr lang="en-US" smtClean="0"/>
-              <a:t>10/17/25</a:t>
+              <a:t>11/13/25</a:t>
             </a:fld>
             <a:endParaRPr lang="en-US"/>
           </a:p>
@@ -1150,7 +1150,7 @@
           <a:p>
             <a:fld id="{807B2B08-B017-4EEC-B17F-079F487C2A94}" type="datetimeFigureOut">
               <a:rPr lang="en-US" smtClean="0"/>
-              <a:t>10/17/25</a:t>
+              <a:t>11/13/25</a:t>
             </a:fld>
             <a:endParaRPr lang="en-US"/>
           </a:p>
@@ -1415,7 +1415,7 @@
           <a:p>
             <a:fld id="{807B2B08-B017-4EEC-B17F-079F487C2A94}" type="datetimeFigureOut">
               <a:rPr lang="en-US" smtClean="0"/>
-              <a:t>10/17/25</a:t>
+              <a:t>11/13/25</a:t>
             </a:fld>
             <a:endParaRPr lang="en-US"/>
           </a:p>
@@ -1827,7 +1827,7 @@
           <a:p>
             <a:fld id="{807B2B08-B017-4EEC-B17F-079F487C2A94}" type="datetimeFigureOut">
               <a:rPr lang="en-US" smtClean="0"/>
-              <a:t>10/17/25</a:t>
+              <a:t>11/13/25</a:t>
             </a:fld>
             <a:endParaRPr lang="en-US"/>
           </a:p>
@@ -1968,7 +1968,7 @@
           <a:p>
             <a:fld id="{807B2B08-B017-4EEC-B17F-079F487C2A94}" type="datetimeFigureOut">
               <a:rPr lang="en-US" smtClean="0"/>
-              <a:t>10/17/25</a:t>
+              <a:t>11/13/25</a:t>
             </a:fld>
             <a:endParaRPr lang="en-US"/>
           </a:p>
@@ -2081,7 +2081,7 @@
           <a:p>
             <a:fld id="{807B2B08-B017-4EEC-B17F-079F487C2A94}" type="datetimeFigureOut">
               <a:rPr lang="en-US" smtClean="0"/>
-              <a:t>10/17/25</a:t>
+              <a:t>11/13/25</a:t>
             </a:fld>
             <a:endParaRPr lang="en-US"/>
           </a:p>
@@ -2392,7 +2392,7 @@
           <a:p>
             <a:fld id="{807B2B08-B017-4EEC-B17F-079F487C2A94}" type="datetimeFigureOut">
               <a:rPr lang="en-US" smtClean="0"/>
-              <a:t>10/17/25</a:t>
+              <a:t>11/13/25</a:t>
             </a:fld>
             <a:endParaRPr lang="en-US"/>
           </a:p>
@@ -2680,7 +2680,7 @@
           <a:p>
             <a:fld id="{807B2B08-B017-4EEC-B17F-079F487C2A94}" type="datetimeFigureOut">
               <a:rPr lang="en-US" smtClean="0"/>
-              <a:t>10/17/25</a:t>
+              <a:t>11/13/25</a:t>
             </a:fld>
             <a:endParaRPr lang="en-US"/>
           </a:p>
@@ -2921,7 +2921,7 @@
           <a:p>
             <a:fld id="{807B2B08-B017-4EEC-B17F-079F487C2A94}" type="datetimeFigureOut">
               <a:rPr lang="en-US" smtClean="0"/>
-              <a:t>10/17/25</a:t>
+              <a:t>11/13/25</a:t>
             </a:fld>
             <a:endParaRPr lang="en-US"/>
           </a:p>
@@ -3356,7 +3356,7 @@
         </p:nvSpPr>
         <p:spPr>
           <a:xfrm>
-            <a:off x="1079864" y="452845"/>
+            <a:off x="1079864" y="240060"/>
             <a:ext cx="9144000" cy="5786006"/>
           </a:xfrm>
         </p:spPr>
@@ -3377,8 +3377,12 @@
               <a:rPr lang="en-US" dirty="0"/>
             </a:br>
             <a:r>
+              <a:rPr lang="en-US" sz="3200" b="1"/>
+              <a:t>Session </a:t>
+            </a:r>
+            <a:r>
               <a:rPr lang="en-US" sz="3200" b="1" dirty="0"/>
-              <a:t>Session 1</a:t>
+              <a:t>1</a:t>
             </a:r>
             <a:br>
               <a:rPr lang="en-US" sz="3200" b="1" dirty="0"/>
@@ -3414,10 +3418,200 @@
           </a:p>
         </p:txBody>
       </p:sp>
+      <p:sp>
+        <p:nvSpPr>
+          <p:cNvPr id="3" name="TextBox 2">
+            <a:extLst>
+              <a:ext uri="{FF2B5EF4-FFF2-40B4-BE49-F238E27FC236}">
+                <a16:creationId xmlns:a16="http://schemas.microsoft.com/office/drawing/2014/main" id="{64A49644-702C-104B-A3C2-E81A66E02B10}"/>
+              </a:ext>
+            </a:extLst>
+          </p:cNvPr>
+          <p:cNvSpPr txBox="1"/>
+          <p:nvPr/>
+        </p:nvSpPr>
+        <p:spPr>
+          <a:xfrm>
+            <a:off x="333555" y="6331012"/>
+            <a:ext cx="2179608" cy="430887"/>
+          </a:xfrm>
+          <a:prstGeom prst="rect">
+            <a:avLst/>
+          </a:prstGeom>
+          <a:noFill/>
+        </p:spPr>
+        <p:txBody>
+          <a:bodyPr wrap="square" rtlCol="0">
+            <a:spAutoFit/>
+          </a:bodyPr>
+          <a:lstStyle/>
+          <a:p>
+            <a:r>
+              <a:rPr lang="en-US" sz="1100" dirty="0">
+                <a:latin typeface="+mj-lt"/>
+              </a:rPr>
+              <a:t>@</a:t>
+            </a:r>
+            <a:r>
+              <a:rPr lang="en-US" sz="1100" dirty="0" err="1">
+                <a:latin typeface="+mj-lt"/>
+              </a:rPr>
+              <a:t>maryamzim</a:t>
+            </a:r>
+            <a:r>
+              <a:rPr lang="en-US" sz="1100" dirty="0">
+                <a:latin typeface="+mj-lt"/>
+              </a:rPr>
+              <a:t> </a:t>
+            </a:r>
+            <a:r>
+              <a:rPr lang="en-US" sz="1100" dirty="0" err="1">
+                <a:latin typeface="+mj-lt"/>
+              </a:rPr>
+              <a:t>maryamxiim@gmail.com</a:t>
+            </a:r>
+            <a:endParaRPr lang="en-US" sz="1100" dirty="0">
+              <a:latin typeface="+mj-lt"/>
+            </a:endParaRPr>
+          </a:p>
+        </p:txBody>
+      </p:sp>
+      <p:cxnSp>
+        <p:nvCxnSpPr>
+          <p:cNvPr id="5" name="Straight Connector 4">
+            <a:extLst>
+              <a:ext uri="{FF2B5EF4-FFF2-40B4-BE49-F238E27FC236}">
+                <a16:creationId xmlns:a16="http://schemas.microsoft.com/office/drawing/2014/main" id="{9139A4A4-6725-59CF-7099-1F9127951243}"/>
+              </a:ext>
+            </a:extLst>
+          </p:cNvPr>
+          <p:cNvCxnSpPr>
+            <a:cxnSpLocks/>
+          </p:cNvCxnSpPr>
+          <p:nvPr/>
+        </p:nvCxnSpPr>
+        <p:spPr>
+          <a:xfrm>
+            <a:off x="0" y="6239774"/>
+            <a:ext cx="12192000" cy="0"/>
+          </a:xfrm>
+          <a:prstGeom prst="line">
+            <a:avLst/>
+          </a:prstGeom>
+        </p:spPr>
+        <p:style>
+          <a:lnRef idx="1">
+            <a:schemeClr val="dk1"/>
+          </a:lnRef>
+          <a:fillRef idx="0">
+            <a:schemeClr val="dk1"/>
+          </a:fillRef>
+          <a:effectRef idx="0">
+            <a:schemeClr val="dk1"/>
+          </a:effectRef>
+          <a:fontRef idx="minor">
+            <a:schemeClr val="tx1"/>
+          </a:fontRef>
+        </p:style>
+      </p:cxnSp>
+      <p:pic>
+        <p:nvPicPr>
+          <p:cNvPr id="20482" name="Picture 2">
+            <a:extLst>
+              <a:ext uri="{FF2B5EF4-FFF2-40B4-BE49-F238E27FC236}">
+                <a16:creationId xmlns:a16="http://schemas.microsoft.com/office/drawing/2014/main" id="{C0C7CD75-3CDC-8F39-FAB2-BC9933D5BCEE}"/>
+              </a:ext>
+            </a:extLst>
+          </p:cNvPr>
+          <p:cNvPicPr>
+            <a:picLocks noChangeAspect="1" noChangeArrowheads="1"/>
+          </p:cNvPicPr>
+          <p:nvPr/>
+        </p:nvPicPr>
+        <p:blipFill>
+          <a:blip r:embed="rId2">
+            <a:extLst>
+              <a:ext uri="{28A0092B-C50C-407E-A947-70E740481C1C}">
+                <a14:useLocalDpi xmlns:a14="http://schemas.microsoft.com/office/drawing/2010/main" val="0"/>
+              </a:ext>
+            </a:extLst>
+          </a:blip>
+          <a:srcRect/>
+          <a:stretch>
+            <a:fillRect/>
+          </a:stretch>
+        </p:blipFill>
+        <p:spPr bwMode="auto">
+          <a:xfrm>
+            <a:off x="240580" y="6406516"/>
+            <a:ext cx="139939" cy="139939"/>
+          </a:xfrm>
+          <a:prstGeom prst="rect">
+            <a:avLst/>
+          </a:prstGeom>
+          <a:noFill/>
+          <a:extLst>
+            <a:ext uri="{909E8E84-426E-40DD-AFC4-6F175D3DCCD1}">
+              <a14:hiddenFill xmlns:a14="http://schemas.microsoft.com/office/drawing/2010/main">
+                <a:solidFill>
+                  <a:srgbClr val="FFFFFF"/>
+                </a:solidFill>
+              </a14:hiddenFill>
+            </a:ext>
+          </a:extLst>
+        </p:spPr>
+      </p:pic>
+      <p:pic>
+        <p:nvPicPr>
+          <p:cNvPr id="20484" name="Picture 4">
+            <a:extLst>
+              <a:ext uri="{FF2B5EF4-FFF2-40B4-BE49-F238E27FC236}">
+                <a16:creationId xmlns:a16="http://schemas.microsoft.com/office/drawing/2014/main" id="{897B446E-8E4A-1444-0B25-280230FC1E52}"/>
+              </a:ext>
+            </a:extLst>
+          </p:cNvPr>
+          <p:cNvPicPr>
+            <a:picLocks noChangeAspect="1" noChangeArrowheads="1"/>
+          </p:cNvPicPr>
+          <p:nvPr/>
+        </p:nvPicPr>
+        <p:blipFill>
+          <a:blip r:embed="rId3">
+            <a:extLst>
+              <a:ext uri="{28A0092B-C50C-407E-A947-70E740481C1C}">
+                <a14:useLocalDpi xmlns:a14="http://schemas.microsoft.com/office/drawing/2010/main" val="0"/>
+              </a:ext>
+            </a:extLst>
+          </a:blip>
+          <a:srcRect/>
+          <a:stretch>
+            <a:fillRect/>
+          </a:stretch>
+        </p:blipFill>
+        <p:spPr bwMode="auto">
+          <a:xfrm>
+            <a:off x="241536" y="6593099"/>
+            <a:ext cx="138983" cy="99151"/>
+          </a:xfrm>
+          <a:prstGeom prst="rect">
+            <a:avLst/>
+          </a:prstGeom>
+          <a:noFill/>
+          <a:extLst>
+            <a:ext uri="{909E8E84-426E-40DD-AFC4-6F175D3DCCD1}">
+              <a14:hiddenFill xmlns:a14="http://schemas.microsoft.com/office/drawing/2010/main">
+                <a:solidFill>
+                  <a:srgbClr val="FFFFFF"/>
+                </a:solidFill>
+              </a14:hiddenFill>
+            </a:ext>
+          </a:extLst>
+        </p:spPr>
+      </p:pic>
     </p:spTree>
     <p:extLst>
       <p:ext uri="{BB962C8B-B14F-4D97-AF65-F5344CB8AC3E}">
-        <p14:creationId xmlns:p14="http://schemas.microsoft.com/office/powerpoint/2010/main" val="479985526"/>
+        <p14:creationId xmlns:p14="http://schemas.microsoft.com/office/powerpoint/2010/main" val="80005758"/>
       </p:ext>
     </p:extLst>
   </p:cSld>

</xml_diff>